<commit_message>
Second Commit to Bioc Revisions
</commit_message>
<xml_diff>
--- a/inst/gCrisprTools_package_design.pptx
+++ b/inst/gCrisprTools_package_design.pptx
@@ -290,7 +290,7 @@
           <a:p>
             <a:fld id="{F85D0C8E-18C7-8A41-9B4F-879476E78C2D}" type="datetimeFigureOut">
               <a:rPr lang="en-US" smtClean="0"/>
-              <a:t>5/16/16</a:t>
+              <a:t>8/1/16</a:t>
             </a:fld>
             <a:endParaRPr lang="en-US"/>
           </a:p>
@@ -460,7 +460,7 @@
           <a:p>
             <a:fld id="{F85D0C8E-18C7-8A41-9B4F-879476E78C2D}" type="datetimeFigureOut">
               <a:rPr lang="en-US" smtClean="0"/>
-              <a:t>5/16/16</a:t>
+              <a:t>8/1/16</a:t>
             </a:fld>
             <a:endParaRPr lang="en-US"/>
           </a:p>
@@ -640,7 +640,7 @@
           <a:p>
             <a:fld id="{F85D0C8E-18C7-8A41-9B4F-879476E78C2D}" type="datetimeFigureOut">
               <a:rPr lang="en-US" smtClean="0"/>
-              <a:t>5/16/16</a:t>
+              <a:t>8/1/16</a:t>
             </a:fld>
             <a:endParaRPr lang="en-US"/>
           </a:p>
@@ -810,7 +810,7 @@
           <a:p>
             <a:fld id="{F85D0C8E-18C7-8A41-9B4F-879476E78C2D}" type="datetimeFigureOut">
               <a:rPr lang="en-US" smtClean="0"/>
-              <a:t>5/16/16</a:t>
+              <a:t>8/1/16</a:t>
             </a:fld>
             <a:endParaRPr lang="en-US"/>
           </a:p>
@@ -1056,7 +1056,7 @@
           <a:p>
             <a:fld id="{F85D0C8E-18C7-8A41-9B4F-879476E78C2D}" type="datetimeFigureOut">
               <a:rPr lang="en-US" smtClean="0"/>
-              <a:t>5/16/16</a:t>
+              <a:t>8/1/16</a:t>
             </a:fld>
             <a:endParaRPr lang="en-US"/>
           </a:p>
@@ -1344,7 +1344,7 @@
           <a:p>
             <a:fld id="{F85D0C8E-18C7-8A41-9B4F-879476E78C2D}" type="datetimeFigureOut">
               <a:rPr lang="en-US" smtClean="0"/>
-              <a:t>5/16/16</a:t>
+              <a:t>8/1/16</a:t>
             </a:fld>
             <a:endParaRPr lang="en-US"/>
           </a:p>
@@ -1766,7 +1766,7 @@
           <a:p>
             <a:fld id="{F85D0C8E-18C7-8A41-9B4F-879476E78C2D}" type="datetimeFigureOut">
               <a:rPr lang="en-US" smtClean="0"/>
-              <a:t>5/16/16</a:t>
+              <a:t>8/1/16</a:t>
             </a:fld>
             <a:endParaRPr lang="en-US"/>
           </a:p>
@@ -1884,7 +1884,7 @@
           <a:p>
             <a:fld id="{F85D0C8E-18C7-8A41-9B4F-879476E78C2D}" type="datetimeFigureOut">
               <a:rPr lang="en-US" smtClean="0"/>
-              <a:t>5/16/16</a:t>
+              <a:t>8/1/16</a:t>
             </a:fld>
             <a:endParaRPr lang="en-US"/>
           </a:p>
@@ -1979,7 +1979,7 @@
           <a:p>
             <a:fld id="{F85D0C8E-18C7-8A41-9B4F-879476E78C2D}" type="datetimeFigureOut">
               <a:rPr lang="en-US" smtClean="0"/>
-              <a:t>5/16/16</a:t>
+              <a:t>8/1/16</a:t>
             </a:fld>
             <a:endParaRPr lang="en-US"/>
           </a:p>
@@ -2256,7 +2256,7 @@
           <a:p>
             <a:fld id="{F85D0C8E-18C7-8A41-9B4F-879476E78C2D}" type="datetimeFigureOut">
               <a:rPr lang="en-US" smtClean="0"/>
-              <a:t>5/16/16</a:t>
+              <a:t>8/1/16</a:t>
             </a:fld>
             <a:endParaRPr lang="en-US"/>
           </a:p>
@@ -2509,7 +2509,7 @@
           <a:p>
             <a:fld id="{F85D0C8E-18C7-8A41-9B4F-879476E78C2D}" type="datetimeFigureOut">
               <a:rPr lang="en-US" smtClean="0"/>
-              <a:t>5/16/16</a:t>
+              <a:t>8/1/16</a:t>
             </a:fld>
             <a:endParaRPr lang="en-US"/>
           </a:p>
@@ -2722,7 +2722,7 @@
           <a:p>
             <a:fld id="{F85D0C8E-18C7-8A41-9B4F-879476E78C2D}" type="datetimeFigureOut">
               <a:rPr lang="en-US" smtClean="0"/>
-              <a:t>5/16/16</a:t>
+              <a:t>8/1/16</a:t>
             </a:fld>
             <a:endParaRPr lang="en-US"/>
           </a:p>
@@ -4793,68 +4793,6 @@
       </p:sp>
       <p:sp>
         <p:nvSpPr>
-          <p:cNvPr id="21" name="Rounded Rectangle 20"/>
-          <p:cNvSpPr/>
-          <p:nvPr/>
-        </p:nvSpPr>
-        <p:spPr>
-          <a:xfrm>
-            <a:off x="1470208" y="5141728"/>
-            <a:ext cx="2446256" cy="1290024"/>
-          </a:xfrm>
-          <a:prstGeom prst="roundRect">
-            <a:avLst/>
-          </a:prstGeom>
-          <a:solidFill>
-            <a:schemeClr val="accent3">
-              <a:lumMod val="60000"/>
-              <a:lumOff val="40000"/>
-            </a:schemeClr>
-          </a:solidFill>
-        </p:spPr>
-        <p:style>
-          <a:lnRef idx="1">
-            <a:schemeClr val="accent1"/>
-          </a:lnRef>
-          <a:fillRef idx="3">
-            <a:schemeClr val="accent1"/>
-          </a:fillRef>
-          <a:effectRef idx="2">
-            <a:schemeClr val="accent1"/>
-          </a:effectRef>
-          <a:fontRef idx="minor">
-            <a:schemeClr val="lt1"/>
-          </a:fontRef>
-        </p:style>
-        <p:txBody>
-          <a:bodyPr rtlCol="0" anchor="ctr" anchorCtr="0">
-            <a:normAutofit/>
-          </a:bodyPr>
-          <a:lstStyle/>
-          <a:p>
-            <a:pPr algn="ctr"/>
-            <a:r>
-              <a:rPr lang="en-US" dirty="0" err="1" smtClean="0">
-                <a:solidFill>
-                  <a:schemeClr val="bg2">
-                    <a:lumMod val="25000"/>
-                  </a:schemeClr>
-                </a:solidFill>
-              </a:rPr>
-              <a:t>guideCDF</a:t>
-            </a:r>
-            <a:endParaRPr lang="en-US" dirty="0">
-              <a:solidFill>
-                <a:schemeClr val="bg2">
-                  <a:lumMod val="25000"/>
-                </a:schemeClr>
-              </a:solidFill>
-            </a:endParaRPr>
-          </a:p>
-        </p:txBody>
-      </p:sp>
-      <p:sp>
-        <p:nvSpPr>
           <p:cNvPr id="22" name="Rounded Rectangle 21"/>
           <p:cNvSpPr/>
           <p:nvPr/>
@@ -4862,7 +4800,7 @@
         <p:spPr>
           <a:xfrm>
             <a:off x="1470208" y="1838306"/>
-            <a:ext cx="2446256" cy="1118996"/>
+            <a:ext cx="2446256" cy="914400"/>
           </a:xfrm>
           <a:prstGeom prst="roundRect">
             <a:avLst/>
@@ -5047,8 +4985,8 @@
         </p:nvSpPr>
         <p:spPr>
           <a:xfrm>
-            <a:off x="1470208" y="3421736"/>
-            <a:ext cx="2446255" cy="1159292"/>
+            <a:off x="1470208" y="3068140"/>
+            <a:ext cx="2446255" cy="914400"/>
           </a:xfrm>
           <a:prstGeom prst="roundRect">
             <a:avLst/>
@@ -5834,7 +5772,7 @@
           </a:xfrm>
           <a:prstGeom prst="bentConnector3">
             <a:avLst>
-              <a:gd name="adj1" fmla="val 9975"/>
+              <a:gd name="adj1" fmla="val 11247"/>
             </a:avLst>
           </a:prstGeom>
           <a:ln>
@@ -5866,12 +5804,12 @@
         </p:nvCxnSpPr>
         <p:spPr>
           <a:xfrm>
-            <a:off x="3916463" y="4001382"/>
-            <a:ext cx="3194536" cy="1140346"/>
+            <a:off x="3916463" y="3525340"/>
+            <a:ext cx="3194535" cy="1636234"/>
           </a:xfrm>
           <a:prstGeom prst="bentConnector3">
             <a:avLst>
-              <a:gd name="adj1" fmla="val 5345"/>
+              <a:gd name="adj1" fmla="val 7700"/>
             </a:avLst>
           </a:prstGeom>
           <a:ln>
@@ -5902,13 +5840,13 @@
           <p:nvPr/>
         </p:nvCxnSpPr>
         <p:spPr>
-          <a:xfrm flipV="1">
-            <a:off x="3916464" y="5294128"/>
-            <a:ext cx="3194534" cy="492612"/>
+          <a:xfrm>
+            <a:off x="3916464" y="4755174"/>
+            <a:ext cx="3194535" cy="568666"/>
           </a:xfrm>
           <a:prstGeom prst="bentConnector3">
             <a:avLst>
-              <a:gd name="adj1" fmla="val 50000"/>
+              <a:gd name="adj1" fmla="val 3884"/>
             </a:avLst>
           </a:prstGeom>
           <a:ln>
@@ -5941,18 +5879,19 @@
         </p:nvCxnSpPr>
         <p:spPr>
           <a:xfrm rot="5400000">
-            <a:off x="1782412" y="1192377"/>
-            <a:ext cx="893224" cy="1517631"/>
+            <a:off x="1833561" y="1141228"/>
+            <a:ext cx="790926" cy="1517631"/>
           </a:xfrm>
           <a:prstGeom prst="bentConnector4">
             <a:avLst>
-              <a:gd name="adj1" fmla="val 29394"/>
-              <a:gd name="adj2" fmla="val 114490"/>
+              <a:gd name="adj1" fmla="val 21097"/>
+              <a:gd name="adj2" fmla="val 114393"/>
             </a:avLst>
           </a:prstGeom>
           <a:ln>
             <a:tailEnd type="arrow"/>
           </a:ln>
+          <a:effectLst/>
         </p:spPr>
         <p:style>
           <a:lnRef idx="2">
@@ -5980,18 +5919,19 @@
         </p:nvCxnSpPr>
         <p:spPr>
           <a:xfrm rot="5400000">
-            <a:off x="980623" y="1994166"/>
-            <a:ext cx="2496802" cy="1517631"/>
+            <a:off x="1218644" y="1756145"/>
+            <a:ext cx="2020760" cy="1517631"/>
           </a:xfrm>
           <a:prstGeom prst="bentConnector4">
             <a:avLst>
-              <a:gd name="adj1" fmla="val 6687"/>
-              <a:gd name="adj2" fmla="val 139135"/>
+              <a:gd name="adj1" fmla="val 8017"/>
+              <a:gd name="adj2" fmla="val 115063"/>
             </a:avLst>
           </a:prstGeom>
           <a:ln>
             <a:tailEnd type="arrow"/>
           </a:ln>
+          <a:effectLst/>
         </p:spPr>
         <p:style>
           <a:lnRef idx="2">
@@ -6019,18 +5959,19 @@
         </p:nvCxnSpPr>
         <p:spPr>
           <a:xfrm rot="5400000">
-            <a:off x="87944" y="2886845"/>
-            <a:ext cx="4282160" cy="1517631"/>
+            <a:off x="603727" y="2371062"/>
+            <a:ext cx="3250594" cy="1517631"/>
           </a:xfrm>
           <a:prstGeom prst="bentConnector4">
             <a:avLst>
-              <a:gd name="adj1" fmla="val 1638"/>
-              <a:gd name="adj2" fmla="val 163207"/>
+              <a:gd name="adj1" fmla="val 4835"/>
+              <a:gd name="adj2" fmla="val 115732"/>
             </a:avLst>
           </a:prstGeom>
           <a:ln>
             <a:tailEnd type="arrow"/>
           </a:ln>
+          <a:effectLst/>
         </p:spPr>
         <p:style>
           <a:lnRef idx="2">
@@ -6070,6 +6011,204 @@
           <a:ln>
             <a:tailEnd type="arrow"/>
           </a:ln>
+        </p:spPr>
+        <p:style>
+          <a:lnRef idx="2">
+            <a:schemeClr val="accent1"/>
+          </a:lnRef>
+          <a:fillRef idx="0">
+            <a:schemeClr val="accent1"/>
+          </a:fillRef>
+          <a:effectRef idx="1">
+            <a:schemeClr val="accent1"/>
+          </a:effectRef>
+          <a:fontRef idx="minor">
+            <a:schemeClr val="tx1"/>
+          </a:fontRef>
+        </p:style>
+      </p:cxnSp>
+      <p:sp>
+        <p:nvSpPr>
+          <p:cNvPr id="33" name="Rounded Rectangle 32"/>
+          <p:cNvSpPr/>
+          <p:nvPr/>
+        </p:nvSpPr>
+        <p:spPr>
+          <a:xfrm>
+            <a:off x="1470208" y="5527808"/>
+            <a:ext cx="2446256" cy="914400"/>
+          </a:xfrm>
+          <a:prstGeom prst="roundRect">
+            <a:avLst/>
+          </a:prstGeom>
+          <a:solidFill>
+            <a:schemeClr val="accent3">
+              <a:lumMod val="60000"/>
+              <a:lumOff val="40000"/>
+            </a:schemeClr>
+          </a:solidFill>
+        </p:spPr>
+        <p:style>
+          <a:lnRef idx="1">
+            <a:schemeClr val="accent1"/>
+          </a:lnRef>
+          <a:fillRef idx="3">
+            <a:schemeClr val="accent1"/>
+          </a:fillRef>
+          <a:effectRef idx="2">
+            <a:schemeClr val="accent1"/>
+          </a:effectRef>
+          <a:fontRef idx="minor">
+            <a:schemeClr val="lt1"/>
+          </a:fontRef>
+        </p:style>
+        <p:txBody>
+          <a:bodyPr rtlCol="0" anchor="ctr" anchorCtr="0">
+            <a:normAutofit/>
+          </a:bodyPr>
+          <a:lstStyle/>
+          <a:p>
+            <a:pPr algn="ctr"/>
+            <a:r>
+              <a:rPr lang="en-US" dirty="0" err="1" smtClean="0">
+                <a:solidFill>
+                  <a:schemeClr val="bg2">
+                    <a:lumMod val="25000"/>
+                  </a:schemeClr>
+                </a:solidFill>
+              </a:rPr>
+              <a:t>guideCDF</a:t>
+            </a:r>
+            <a:endParaRPr lang="en-US" dirty="0">
+              <a:solidFill>
+                <a:schemeClr val="bg2">
+                  <a:lumMod val="25000"/>
+                </a:schemeClr>
+              </a:solidFill>
+            </a:endParaRPr>
+          </a:p>
+        </p:txBody>
+      </p:sp>
+      <p:sp>
+        <p:nvSpPr>
+          <p:cNvPr id="21" name="Rounded Rectangle 20"/>
+          <p:cNvSpPr/>
+          <p:nvPr/>
+        </p:nvSpPr>
+        <p:spPr>
+          <a:xfrm>
+            <a:off x="1470208" y="4297974"/>
+            <a:ext cx="2446256" cy="914400"/>
+          </a:xfrm>
+          <a:prstGeom prst="roundRect">
+            <a:avLst/>
+          </a:prstGeom>
+          <a:solidFill>
+            <a:schemeClr val="accent3">
+              <a:lumMod val="60000"/>
+              <a:lumOff val="40000"/>
+            </a:schemeClr>
+          </a:solidFill>
+        </p:spPr>
+        <p:style>
+          <a:lnRef idx="1">
+            <a:schemeClr val="accent1"/>
+          </a:lnRef>
+          <a:fillRef idx="3">
+            <a:schemeClr val="accent1"/>
+          </a:fillRef>
+          <a:effectRef idx="2">
+            <a:schemeClr val="accent1"/>
+          </a:effectRef>
+          <a:fontRef idx="minor">
+            <a:schemeClr val="lt1"/>
+          </a:fontRef>
+        </p:style>
+        <p:txBody>
+          <a:bodyPr rtlCol="0" anchor="ctr" anchorCtr="0">
+            <a:normAutofit/>
+          </a:bodyPr>
+          <a:lstStyle/>
+          <a:p>
+            <a:pPr algn="ctr"/>
+            <a:r>
+              <a:rPr lang="en-US" dirty="0" err="1" smtClean="0">
+                <a:solidFill>
+                  <a:schemeClr val="bg2">
+                    <a:lumMod val="25000"/>
+                  </a:schemeClr>
+                </a:solidFill>
+              </a:rPr>
+              <a:t>GCbias</a:t>
+            </a:r>
+            <a:endParaRPr lang="en-US" dirty="0">
+              <a:solidFill>
+                <a:schemeClr val="bg2">
+                  <a:lumMod val="25000"/>
+                </a:schemeClr>
+              </a:solidFill>
+            </a:endParaRPr>
+          </a:p>
+        </p:txBody>
+      </p:sp>
+      <p:cxnSp>
+        <p:nvCxnSpPr>
+          <p:cNvPr id="50" name="Elbow Connector 98"/>
+          <p:cNvCxnSpPr>
+            <a:stCxn id="33" idx="3"/>
+          </p:cNvCxnSpPr>
+          <p:nvPr/>
+        </p:nvCxnSpPr>
+        <p:spPr>
+          <a:xfrm flipV="1">
+            <a:off x="3916464" y="5476240"/>
+            <a:ext cx="3194534" cy="508768"/>
+          </a:xfrm>
+          <a:prstGeom prst="bentConnector3">
+            <a:avLst>
+              <a:gd name="adj1" fmla="val 4520"/>
+            </a:avLst>
+          </a:prstGeom>
+          <a:ln>
+            <a:tailEnd type="arrow"/>
+          </a:ln>
+        </p:spPr>
+        <p:style>
+          <a:lnRef idx="2">
+            <a:schemeClr val="accent1"/>
+          </a:lnRef>
+          <a:fillRef idx="0">
+            <a:schemeClr val="accent1"/>
+          </a:fillRef>
+          <a:effectRef idx="1">
+            <a:schemeClr val="accent1"/>
+          </a:effectRef>
+          <a:fontRef idx="minor">
+            <a:schemeClr val="tx1"/>
+          </a:fontRef>
+        </p:style>
+      </p:cxnSp>
+      <p:cxnSp>
+        <p:nvCxnSpPr>
+          <p:cNvPr id="54" name="Elbow Connector 98"/>
+          <p:cNvCxnSpPr/>
+          <p:nvPr/>
+        </p:nvCxnSpPr>
+        <p:spPr>
+          <a:xfrm rot="5400000">
+            <a:off x="-11190" y="3067260"/>
+            <a:ext cx="4480428" cy="1517631"/>
+          </a:xfrm>
+          <a:prstGeom prst="bentConnector4">
+            <a:avLst>
+              <a:gd name="adj1" fmla="val 1812"/>
+              <a:gd name="adj2" fmla="val 115732"/>
+            </a:avLst>
+          </a:prstGeom>
+          <a:ln>
+            <a:tailEnd type="arrow"/>
+          </a:ln>
+          <a:effectLst/>
         </p:spPr>
         <p:style>
           <a:lnRef idx="2">

</xml_diff>